<commit_message>
Larry the Loving Llama
</commit_message>
<xml_diff>
--- a/OOSD_Project2_Team5_Presentation.pptx
+++ b/OOSD_Project2_Team5_Presentation.pptx
@@ -11975,11 +11975,7 @@
           <a:p>
             <a:r>
               <a:rPr lang="en-US" dirty="0" smtClean="0"/>
-              <a:t>There’s even a “complaints” page that is linked from the about page</a:t>
-            </a:r>
-            <a:r>
-              <a:rPr lang="en-US" dirty="0" smtClean="0"/>
-              <a:t>.</a:t>
+              <a:t>There’s even a “complaints” page that is linked from the about page.</a:t>
             </a:r>
           </a:p>
           <a:p>
@@ -12067,13 +12063,13 @@
   <p:clrMapOvr>
     <a:masterClrMapping/>
   </p:clrMapOvr>
-  <mc:AlternateContent xmlns:mc="http://schemas.openxmlformats.org/markup-compatibility/2006">
-    <mc:Choice xmlns:p14="http://schemas.microsoft.com/office/powerpoint/2010/main" Requires="p14">
+  <mc:AlternateContent xmlns:mc="http://schemas.openxmlformats.org/markup-compatibility/2006" xmlns:p14="http://schemas.microsoft.com/office/powerpoint/2010/main">
+    <mc:Choice Requires="p14">
       <p:transition spd="slow" p14:dur="1400">
         <p14:doors dir="vert"/>
       </p:transition>
     </mc:Choice>
-    <mc:Fallback>
+    <mc:Fallback xmlns="">
       <p:transition spd="slow">
         <p:fade/>
       </p:transition>
@@ -13884,7 +13880,13 @@
           <a:p>
             <a:r>
               <a:rPr lang="en-US" dirty="0" smtClean="0"/>
-              <a:t>Building a mobile app for customers to set up their vacations through packages</a:t>
+              <a:t>Building a mobile app for customers to set up their vacations through packages.</a:t>
+            </a:r>
+          </a:p>
+          <a:p>
+            <a:r>
+              <a:rPr lang="en-US" dirty="0" smtClean="0"/>
+              <a:t>Building a Mac/”Linux” version for non-Windows workstations</a:t>
             </a:r>
             <a:r>
               <a:rPr lang="en-US" dirty="0" smtClean="0"/>
@@ -13894,7 +13896,23 @@
           <a:p>
             <a:r>
               <a:rPr lang="en-US" dirty="0" smtClean="0"/>
-              <a:t>Building a Mac/”Linux” version for non-Windows workstations.</a:t>
+              <a:t>Using </a:t>
+            </a:r>
+            <a:r>
+              <a:rPr lang="en-US" dirty="0" err="1" smtClean="0"/>
+              <a:t>FaceBook’s</a:t>
+            </a:r>
+            <a:r>
+              <a:rPr lang="en-US" dirty="0" smtClean="0"/>
+              <a:t> </a:t>
+            </a:r>
+            <a:r>
+              <a:rPr lang="en-US" dirty="0" err="1" smtClean="0"/>
+              <a:t>OpenAuth</a:t>
+            </a:r>
+            <a:r>
+              <a:rPr lang="en-US" dirty="0" smtClean="0"/>
+              <a:t> to login and register customers.</a:t>
             </a:r>
             <a:endParaRPr lang="en-US" dirty="0"/>
           </a:p>
@@ -13922,8 +13940,8 @@
         </p:blipFill>
         <p:spPr>
           <a:xfrm>
-            <a:off x="2447353" y="3405759"/>
-            <a:ext cx="2524125" cy="2990850"/>
+            <a:off x="2447353" y="3590487"/>
+            <a:ext cx="2524125" cy="2806121"/>
           </a:xfrm>
           <a:prstGeom prst="rect">
             <a:avLst/>
@@ -13970,13 +13988,13 @@
   <p:clrMapOvr>
     <a:masterClrMapping/>
   </p:clrMapOvr>
-  <mc:AlternateContent xmlns:mc="http://schemas.openxmlformats.org/markup-compatibility/2006">
-    <mc:Choice xmlns:p14="http://schemas.microsoft.com/office/powerpoint/2010/main" Requires="p14">
+  <mc:AlternateContent xmlns:mc="http://schemas.openxmlformats.org/markup-compatibility/2006" xmlns:p14="http://schemas.microsoft.com/office/powerpoint/2010/main">
+    <mc:Choice Requires="p14">
       <p:transition spd="slow" p14:dur="3900">
         <p14:glitter pattern="hexagon"/>
       </p:transition>
     </mc:Choice>
-    <mc:Fallback>
+    <mc:Fallback xmlns="">
       <p:transition spd="slow">
         <p:fade/>
       </p:transition>
@@ -14431,14 +14449,156 @@
                             </p:stCondLst>
                             <p:childTnLst>
                               <p:par>
-                                <p:cTn id="32" presetID="16" presetClass="exit" presetSubtype="21" fill="hold" nodeType="clickEffect">
+                                <p:cTn id="32" presetID="31" presetClass="entr" presetSubtype="0" fill="hold" grpId="0" nodeType="clickEffect">
+                                  <p:stCondLst>
+                                    <p:cond delay="0"/>
+                                  </p:stCondLst>
+                                  <p:childTnLst>
+                                    <p:set>
+                                      <p:cBhvr>
+                                        <p:cTn id="33" dur="1" fill="hold">
+                                          <p:stCondLst>
+                                            <p:cond delay="0"/>
+                                          </p:stCondLst>
+                                        </p:cTn>
+                                        <p:tgtEl>
+                                          <p:spTgt spid="3">
+                                            <p:txEl>
+                                              <p:pRg st="2" end="2"/>
+                                            </p:txEl>
+                                          </p:spTgt>
+                                        </p:tgtEl>
+                                        <p:attrNameLst>
+                                          <p:attrName>style.visibility</p:attrName>
+                                        </p:attrNameLst>
+                                      </p:cBhvr>
+                                      <p:to>
+                                        <p:strVal val="visible"/>
+                                      </p:to>
+                                    </p:set>
+                                    <p:anim calcmode="lin" valueType="num">
+                                      <p:cBhvr>
+                                        <p:cTn id="34" dur="1000" fill="hold"/>
+                                        <p:tgtEl>
+                                          <p:spTgt spid="3">
+                                            <p:txEl>
+                                              <p:pRg st="2" end="2"/>
+                                            </p:txEl>
+                                          </p:spTgt>
+                                        </p:tgtEl>
+                                        <p:attrNameLst>
+                                          <p:attrName>ppt_w</p:attrName>
+                                        </p:attrNameLst>
+                                      </p:cBhvr>
+                                      <p:tavLst>
+                                        <p:tav tm="0">
+                                          <p:val>
+                                            <p:fltVal val="0"/>
+                                          </p:val>
+                                        </p:tav>
+                                        <p:tav tm="100000">
+                                          <p:val>
+                                            <p:strVal val="#ppt_w"/>
+                                          </p:val>
+                                        </p:tav>
+                                      </p:tavLst>
+                                    </p:anim>
+                                    <p:anim calcmode="lin" valueType="num">
+                                      <p:cBhvr>
+                                        <p:cTn id="35" dur="1000" fill="hold"/>
+                                        <p:tgtEl>
+                                          <p:spTgt spid="3">
+                                            <p:txEl>
+                                              <p:pRg st="2" end="2"/>
+                                            </p:txEl>
+                                          </p:spTgt>
+                                        </p:tgtEl>
+                                        <p:attrNameLst>
+                                          <p:attrName>ppt_h</p:attrName>
+                                        </p:attrNameLst>
+                                      </p:cBhvr>
+                                      <p:tavLst>
+                                        <p:tav tm="0">
+                                          <p:val>
+                                            <p:fltVal val="0"/>
+                                          </p:val>
+                                        </p:tav>
+                                        <p:tav tm="100000">
+                                          <p:val>
+                                            <p:strVal val="#ppt_h"/>
+                                          </p:val>
+                                        </p:tav>
+                                      </p:tavLst>
+                                    </p:anim>
+                                    <p:anim calcmode="lin" valueType="num">
+                                      <p:cBhvr>
+                                        <p:cTn id="36" dur="1000" fill="hold"/>
+                                        <p:tgtEl>
+                                          <p:spTgt spid="3">
+                                            <p:txEl>
+                                              <p:pRg st="2" end="2"/>
+                                            </p:txEl>
+                                          </p:spTgt>
+                                        </p:tgtEl>
+                                        <p:attrNameLst>
+                                          <p:attrName>style.rotation</p:attrName>
+                                        </p:attrNameLst>
+                                      </p:cBhvr>
+                                      <p:tavLst>
+                                        <p:tav tm="0">
+                                          <p:val>
+                                            <p:fltVal val="90"/>
+                                          </p:val>
+                                        </p:tav>
+                                        <p:tav tm="100000">
+                                          <p:val>
+                                            <p:fltVal val="0"/>
+                                          </p:val>
+                                        </p:tav>
+                                      </p:tavLst>
+                                    </p:anim>
+                                    <p:animEffect transition="in" filter="fade">
+                                      <p:cBhvr>
+                                        <p:cTn id="37" dur="1000"/>
+                                        <p:tgtEl>
+                                          <p:spTgt spid="3">
+                                            <p:txEl>
+                                              <p:pRg st="2" end="2"/>
+                                            </p:txEl>
+                                          </p:spTgt>
+                                        </p:tgtEl>
+                                      </p:cBhvr>
+                                    </p:animEffect>
+                                  </p:childTnLst>
+                                </p:cTn>
+                              </p:par>
+                            </p:childTnLst>
+                          </p:cTn>
+                        </p:par>
+                      </p:childTnLst>
+                    </p:cTn>
+                  </p:par>
+                  <p:par>
+                    <p:cTn id="38" fill="hold">
+                      <p:stCondLst>
+                        <p:cond delay="indefinite"/>
+                      </p:stCondLst>
+                      <p:childTnLst>
+                        <p:par>
+                          <p:cTn id="39" fill="hold">
+                            <p:stCondLst>
+                              <p:cond delay="0"/>
+                            </p:stCondLst>
+                            <p:childTnLst>
+                              <p:par>
+                                <p:cTn id="40" presetID="16" presetClass="exit" presetSubtype="21" fill="hold" nodeType="clickEffect">
                                   <p:stCondLst>
                                     <p:cond delay="0"/>
                                   </p:stCondLst>
                                   <p:childTnLst>
                                     <p:animEffect transition="out" filter="barn(inVertical)">
                                       <p:cBhvr>
-                                        <p:cTn id="33" dur="500"/>
+                                        <p:cTn id="41" dur="500"/>
                                         <p:tgtEl>
                                           <p:spTgt spid="4"/>
                                         </p:tgtEl>
@@ -14446,7 +14606,7 @@
                                     </p:animEffect>
                                     <p:set>
                                       <p:cBhvr>
-                                        <p:cTn id="34" dur="1" fill="hold">
+                                        <p:cTn id="42" dur="1" fill="hold">
                                           <p:stCondLst>
                                             <p:cond delay="499"/>
                                           </p:stCondLst>
@@ -14472,26 +14632,26 @@
                     </p:cTn>
                   </p:par>
                   <p:par>
-                    <p:cTn id="35" fill="hold">
+                    <p:cTn id="43" fill="hold">
                       <p:stCondLst>
                         <p:cond delay="indefinite"/>
                       </p:stCondLst>
                       <p:childTnLst>
                         <p:par>
-                          <p:cTn id="36" fill="hold">
+                          <p:cTn id="44" fill="hold">
                             <p:stCondLst>
                               <p:cond delay="0"/>
                             </p:stCondLst>
                             <p:childTnLst>
                               <p:par>
-                                <p:cTn id="37" presetID="2" presetClass="exit" presetSubtype="9" fill="hold" nodeType="clickEffect">
+                                <p:cTn id="45" presetID="2" presetClass="exit" presetSubtype="9" fill="hold" nodeType="clickEffect">
                                   <p:stCondLst>
                                     <p:cond delay="0"/>
                                   </p:stCondLst>
                                   <p:childTnLst>
                                     <p:anim calcmode="lin" valueType="num">
                                       <p:cBhvr additive="base">
-                                        <p:cTn id="38" dur="500"/>
+                                        <p:cTn id="46" dur="500"/>
                                         <p:tgtEl>
                                           <p:spTgt spid="5"/>
                                         </p:tgtEl>
@@ -14514,7 +14674,7 @@
                                     </p:anim>
                                     <p:anim calcmode="lin" valueType="num">
                                       <p:cBhvr additive="base">
-                                        <p:cTn id="39" dur="500"/>
+                                        <p:cTn id="47" dur="500"/>
                                         <p:tgtEl>
                                           <p:spTgt spid="5"/>
                                         </p:tgtEl>
@@ -14537,7 +14697,7 @@
                                     </p:anim>
                                     <p:set>
                                       <p:cBhvr>
-                                        <p:cTn id="40" dur="1" fill="hold">
+                                        <p:cTn id="48" dur="1" fill="hold">
                                           <p:stCondLst>
                                             <p:cond delay="499"/>
                                           </p:stCondLst>
@@ -14729,13 +14889,13 @@
   <p:clrMapOvr>
     <a:masterClrMapping/>
   </p:clrMapOvr>
-  <mc:AlternateContent xmlns:mc="http://schemas.openxmlformats.org/markup-compatibility/2006">
-    <mc:Choice xmlns:p14="http://schemas.microsoft.com/office/powerpoint/2010/main" Requires="p14">
+  <mc:AlternateContent xmlns:mc="http://schemas.openxmlformats.org/markup-compatibility/2006" xmlns:p14="http://schemas.microsoft.com/office/powerpoint/2010/main">
+    <mc:Choice Requires="p14">
       <p:transition spd="slow" p14:dur="1600">
         <p14:gallery dir="l"/>
       </p:transition>
     </mc:Choice>
-    <mc:Fallback>
+    <mc:Fallback xmlns="">
       <p:transition spd="slow">
         <p:fade/>
       </p:transition>

</xml_diff>

<commit_message>
Wrap up and Future enhancements
</commit_message>
<xml_diff>
--- a/OOSD_Project2_Team5_Presentation.pptx
+++ b/OOSD_Project2_Team5_Presentation.pptx
@@ -11,8 +11,9 @@
     <p:sldId id="258" r:id="rId5"/>
     <p:sldId id="259" r:id="rId6"/>
     <p:sldId id="260" r:id="rId7"/>
-    <p:sldId id="261" r:id="rId8"/>
-    <p:sldId id="262" r:id="rId9"/>
+    <p:sldId id="264" r:id="rId8"/>
+    <p:sldId id="261" r:id="rId9"/>
+    <p:sldId id="262" r:id="rId10"/>
   </p:sldIdLst>
   <p:sldSz cx="12192000" cy="6858000"/>
   <p:notesSz cx="6858000" cy="9144000"/>
@@ -308,7 +309,7 @@
             <a:fld id="{B61BEF0D-F0BB-DE4B-95CE-6DB70DBA9567}" type="datetimeFigureOut">
               <a:rPr lang="en-US" dirty="0"/>
               <a:pPr/>
-              <a:t>2/3/2016</a:t>
+              <a:t>2/4/2016</a:t>
             </a:fld>
             <a:endParaRPr lang="en-US" dirty="0"/>
           </a:p>
@@ -643,7 +644,7 @@
             <a:fld id="{B61BEF0D-F0BB-DE4B-95CE-6DB70DBA9567}" type="datetimeFigureOut">
               <a:rPr lang="en-US" dirty="0"/>
               <a:pPr/>
-              <a:t>2/3/2016</a:t>
+              <a:t>2/4/2016</a:t>
             </a:fld>
             <a:endParaRPr lang="en-US" dirty="0"/>
           </a:p>
@@ -1041,7 +1042,7 @@
             <a:fld id="{B61BEF0D-F0BB-DE4B-95CE-6DB70DBA9567}" type="datetimeFigureOut">
               <a:rPr lang="en-US" dirty="0"/>
               <a:pPr/>
-              <a:t>2/3/2016</a:t>
+              <a:t>2/4/2016</a:t>
             </a:fld>
             <a:endParaRPr lang="en-US" dirty="0"/>
           </a:p>
@@ -1374,7 +1375,7 @@
             <a:fld id="{B61BEF0D-F0BB-DE4B-95CE-6DB70DBA9567}" type="datetimeFigureOut">
               <a:rPr lang="en-US" dirty="0"/>
               <a:pPr/>
-              <a:t>2/3/2016</a:t>
+              <a:t>2/4/2016</a:t>
             </a:fld>
             <a:endParaRPr lang="en-US" dirty="0"/>
           </a:p>
@@ -1691,7 +1692,7 @@
             <a:fld id="{B61BEF0D-F0BB-DE4B-95CE-6DB70DBA9567}" type="datetimeFigureOut">
               <a:rPr lang="en-US" dirty="0"/>
               <a:pPr/>
-              <a:t>2/3/2016</a:t>
+              <a:t>2/4/2016</a:t>
             </a:fld>
             <a:endParaRPr lang="en-US" dirty="0"/>
           </a:p>
@@ -2084,7 +2085,7 @@
             <a:fld id="{B61BEF0D-F0BB-DE4B-95CE-6DB70DBA9567}" type="datetimeFigureOut">
               <a:rPr lang="en-US" dirty="0"/>
               <a:pPr/>
-              <a:t>2/3/2016</a:t>
+              <a:t>2/4/2016</a:t>
             </a:fld>
             <a:endParaRPr lang="en-US" dirty="0"/>
           </a:p>
@@ -2338,7 +2339,7 @@
             <a:fld id="{B61BEF0D-F0BB-DE4B-95CE-6DB70DBA9567}" type="datetimeFigureOut">
               <a:rPr lang="en-US" dirty="0"/>
               <a:pPr/>
-              <a:t>2/3/2016</a:t>
+              <a:t>2/4/2016</a:t>
             </a:fld>
             <a:endParaRPr lang="en-US" dirty="0"/>
           </a:p>
@@ -2597,7 +2598,7 @@
             <a:fld id="{B61BEF0D-F0BB-DE4B-95CE-6DB70DBA9567}" type="datetimeFigureOut">
               <a:rPr lang="en-US" dirty="0"/>
               <a:pPr/>
-              <a:t>2/3/2016</a:t>
+              <a:t>2/4/2016</a:t>
             </a:fld>
             <a:endParaRPr lang="en-US" dirty="0"/>
           </a:p>
@@ -2856,7 +2857,7 @@
             <a:fld id="{B61BEF0D-F0BB-DE4B-95CE-6DB70DBA9567}" type="datetimeFigureOut">
               <a:rPr lang="en-US" dirty="0"/>
               <a:pPr/>
-              <a:t>2/3/2016</a:t>
+              <a:t>2/4/2016</a:t>
             </a:fld>
             <a:endParaRPr lang="en-US" dirty="0"/>
           </a:p>
@@ -3182,7 +3183,7 @@
             <a:fld id="{B61BEF0D-F0BB-DE4B-95CE-6DB70DBA9567}" type="datetimeFigureOut">
               <a:rPr lang="en-US" dirty="0"/>
               <a:pPr/>
-              <a:t>2/3/2016</a:t>
+              <a:t>2/4/2016</a:t>
             </a:fld>
             <a:endParaRPr lang="en-US" dirty="0"/>
           </a:p>
@@ -3502,7 +3503,7 @@
             <a:fld id="{B61BEF0D-F0BB-DE4B-95CE-6DB70DBA9567}" type="datetimeFigureOut">
               <a:rPr lang="en-US" dirty="0"/>
               <a:pPr/>
-              <a:t>2/3/2016</a:t>
+              <a:t>2/4/2016</a:t>
             </a:fld>
             <a:endParaRPr lang="en-US" dirty="0"/>
           </a:p>
@@ -3956,7 +3957,7 @@
             <a:fld id="{B61BEF0D-F0BB-DE4B-95CE-6DB70DBA9567}" type="datetimeFigureOut">
               <a:rPr lang="en-US" dirty="0"/>
               <a:pPr/>
-              <a:t>2/3/2016</a:t>
+              <a:t>2/4/2016</a:t>
             </a:fld>
             <a:endParaRPr lang="en-US" dirty="0"/>
           </a:p>
@@ -4158,7 +4159,7 @@
             <a:fld id="{B61BEF0D-F0BB-DE4B-95CE-6DB70DBA9567}" type="datetimeFigureOut">
               <a:rPr lang="en-US" dirty="0"/>
               <a:pPr/>
-              <a:t>2/3/2016</a:t>
+              <a:t>2/4/2016</a:t>
             </a:fld>
             <a:endParaRPr lang="en-US" dirty="0"/>
           </a:p>
@@ -4332,7 +4333,7 @@
             <a:fld id="{B61BEF0D-F0BB-DE4B-95CE-6DB70DBA9567}" type="datetimeFigureOut">
               <a:rPr lang="en-US" dirty="0"/>
               <a:pPr/>
-              <a:t>2/3/2016</a:t>
+              <a:t>2/4/2016</a:t>
             </a:fld>
             <a:endParaRPr lang="en-US" dirty="0"/>
           </a:p>
@@ -4662,7 +4663,7 @@
             <a:fld id="{B61BEF0D-F0BB-DE4B-95CE-6DB70DBA9567}" type="datetimeFigureOut">
               <a:rPr lang="en-US" dirty="0"/>
               <a:pPr/>
-              <a:t>2/3/2016</a:t>
+              <a:t>2/4/2016</a:t>
             </a:fld>
             <a:endParaRPr lang="en-US" dirty="0"/>
           </a:p>
@@ -5004,7 +5005,7 @@
             <a:fld id="{B61BEF0D-F0BB-DE4B-95CE-6DB70DBA9567}" type="datetimeFigureOut">
               <a:rPr lang="en-US" dirty="0"/>
               <a:pPr/>
-              <a:t>2/3/2016</a:t>
+              <a:t>2/4/2016</a:t>
             </a:fld>
             <a:endParaRPr lang="en-US" dirty="0"/>
           </a:p>
@@ -7055,7 +7056,7 @@
             <a:fld id="{B61BEF0D-F0BB-DE4B-95CE-6DB70DBA9567}" type="datetimeFigureOut">
               <a:rPr lang="en-US" dirty="0"/>
               <a:pPr/>
-              <a:t>2/3/2016</a:t>
+              <a:t>2/4/2016</a:t>
             </a:fld>
             <a:endParaRPr lang="en-US" dirty="0"/>
           </a:p>
@@ -7610,11 +7611,7 @@
           <a:p>
             <a:r>
               <a:rPr lang="en-US" dirty="0" smtClean="0"/>
-              <a:t>The Microsoft Prototype (Status </a:t>
-            </a:r>
-            <a:r>
-              <a:rPr lang="en-US" dirty="0" smtClean="0"/>
-              <a:t>Report)</a:t>
+              <a:t>The Microsoft Prototype (Status Report)</a:t>
             </a:r>
             <a:endParaRPr lang="en-US" dirty="0"/>
           </a:p>
@@ -14876,14 +14873,19 @@
             <p:ph type="title"/>
           </p:nvPr>
         </p:nvSpPr>
-        <p:spPr/>
+        <p:spPr>
+          <a:xfrm>
+            <a:off x="2589212" y="852710"/>
+            <a:ext cx="8911687" cy="1280890"/>
+          </a:xfrm>
+        </p:spPr>
         <p:txBody>
           <a:bodyPr/>
           <a:lstStyle/>
           <a:p>
             <a:r>
               <a:rPr lang="en-US" dirty="0" smtClean="0"/>
-              <a:t>Future Projects</a:t>
+              <a:t>Wrap up</a:t>
             </a:r>
             <a:endParaRPr lang="en-US" dirty="0"/>
           </a:p>
@@ -14906,33 +14908,181 @@
           <a:p>
             <a:r>
               <a:rPr lang="en-US" dirty="0" smtClean="0"/>
-              <a:t>Building a mobile app for customers to set up their vacations through packages.</a:t>
+              <a:t>Graphically appealing</a:t>
             </a:r>
           </a:p>
           <a:p>
             <a:r>
               <a:rPr lang="en-US" dirty="0" smtClean="0"/>
-              <a:t>Building a Mac/”Linux” version for non-Windows workstations</a:t>
+              <a:t>User friendly and Validates information</a:t>
+            </a:r>
+          </a:p>
+          <a:p>
+            <a:r>
+              <a:rPr lang="en-US" dirty="0" smtClean="0"/>
+              <a:t>Easy to navigate as guides </a:t>
             </a:r>
             <a:r>
-              <a:rPr lang="en-US" dirty="0" smtClean="0"/>
-              <a:t>.</a:t>
+              <a:rPr lang="en-US" smtClean="0"/>
+              <a:t>you through</a:t>
             </a:r>
+            <a:endParaRPr lang="en-US" dirty="0" smtClean="0"/>
           </a:p>
           <a:p>
             <a:r>
               <a:rPr lang="en-US" dirty="0" smtClean="0"/>
-              <a:t>Using </a:t>
+              <a:t>Browser friendly</a:t>
             </a:r>
-            <a:r>
-              <a:rPr lang="en-US" dirty="0" err="1" smtClean="0"/>
-              <a:t>FaceBook’s</a:t>
-            </a:r>
+          </a:p>
+          <a:p>
             <a:r>
               <a:rPr lang="en-US" dirty="0" smtClean="0"/>
-              <a:t> OAuth to login and register customers.</a:t>
+              <a:t>Code reusability</a:t>
+            </a:r>
+          </a:p>
+          <a:p>
+            <a:r>
+              <a:rPr lang="en-US" dirty="0" smtClean="0"/>
+              <a:t>Loading speed</a:t>
+            </a:r>
+          </a:p>
+          <a:p>
+            <a:r>
+              <a:rPr lang="en-US" dirty="0" smtClean="0"/>
+              <a:t>Secure and Consistent Layout</a:t>
+            </a:r>
+          </a:p>
+          <a:p>
+            <a:endParaRPr lang="en-US" dirty="0" smtClean="0"/>
+          </a:p>
+          <a:p>
+            <a:endParaRPr lang="en-US" dirty="0" smtClean="0"/>
+          </a:p>
+        </p:txBody>
+      </p:sp>
+    </p:spTree>
+    <p:extLst>
+      <p:ext uri="{BB962C8B-B14F-4D97-AF65-F5344CB8AC3E}">
+        <p14:creationId xmlns:p14="http://schemas.microsoft.com/office/powerpoint/2010/main" val="4024891549"/>
+      </p:ext>
+    </p:extLst>
+  </p:cSld>
+  <p:clrMapOvr>
+    <a:masterClrMapping/>
+  </p:clrMapOvr>
+</p:sld>
+</file>
+
+<file path=ppt/slides/slide8.xml><?xml version="1.0" encoding="utf-8"?>
+<p:sld xmlns:a="http://schemas.openxmlformats.org/drawingml/2006/main" xmlns:r="http://schemas.openxmlformats.org/officeDocument/2006/relationships" xmlns:p="http://schemas.openxmlformats.org/presentationml/2006/main">
+  <p:cSld>
+    <p:spTree>
+      <p:nvGrpSpPr>
+        <p:cNvPr id="1" name=""/>
+        <p:cNvGrpSpPr/>
+        <p:nvPr/>
+      </p:nvGrpSpPr>
+      <p:grpSpPr>
+        <a:xfrm>
+          <a:off x="0" y="0"/>
+          <a:ext cx="0" cy="0"/>
+          <a:chOff x="0" y="0"/>
+          <a:chExt cx="0" cy="0"/>
+        </a:xfrm>
+      </p:grpSpPr>
+      <p:sp>
+        <p:nvSpPr>
+          <p:cNvPr id="2" name="Title 1"/>
+          <p:cNvSpPr>
+            <a:spLocks noGrp="1"/>
+          </p:cNvSpPr>
+          <p:nvPr>
+            <p:ph type="title"/>
+          </p:nvPr>
+        </p:nvSpPr>
+        <p:spPr/>
+        <p:txBody>
+          <a:bodyPr/>
+          <a:lstStyle/>
+          <a:p>
+            <a:r>
+              <a:rPr lang="en-US" dirty="0" smtClean="0"/>
+              <a:t>Future Projects</a:t>
             </a:r>
             <a:endParaRPr lang="en-US" dirty="0"/>
+          </a:p>
+        </p:txBody>
+      </p:sp>
+      <p:sp>
+        <p:nvSpPr>
+          <p:cNvPr id="3" name="Content Placeholder 2"/>
+          <p:cNvSpPr>
+            <a:spLocks noGrp="1"/>
+          </p:cNvSpPr>
+          <p:nvPr>
+            <p:ph idx="1"/>
+          </p:nvPr>
+        </p:nvSpPr>
+        <p:spPr>
+          <a:xfrm>
+            <a:off x="1342239" y="1328256"/>
+            <a:ext cx="9675812" cy="4325923"/>
+          </a:xfrm>
+        </p:spPr>
+        <p:txBody>
+          <a:bodyPr/>
+          <a:lstStyle/>
+          <a:p>
+            <a:r>
+              <a:rPr lang="en-US" dirty="0" smtClean="0"/>
+              <a:t>App development </a:t>
+            </a:r>
+            <a:endParaRPr lang="en-US" dirty="0" smtClean="0"/>
+          </a:p>
+          <a:p>
+            <a:r>
+              <a:rPr lang="en-US" dirty="0"/>
+              <a:t>More semantic</a:t>
+            </a:r>
+          </a:p>
+          <a:p>
+            <a:r>
+              <a:rPr lang="en-US" dirty="0"/>
+              <a:t>Customers reviews and ratings</a:t>
+            </a:r>
+          </a:p>
+          <a:p>
+            <a:r>
+              <a:rPr lang="en-US" dirty="0"/>
+              <a:t>Social media plugins</a:t>
+            </a:r>
+          </a:p>
+          <a:p>
+            <a:r>
+              <a:rPr lang="en-US" dirty="0"/>
+              <a:t>Add vacation dates in your calendars</a:t>
+            </a:r>
+          </a:p>
+          <a:p>
+            <a:r>
+              <a:rPr lang="en-US" dirty="0"/>
+              <a:t>Cross-browser and cross-device support</a:t>
+            </a:r>
+          </a:p>
+          <a:p>
+            <a:r>
+              <a:rPr lang="en-US" dirty="0"/>
+              <a:t>Add accessibility</a:t>
+            </a:r>
+          </a:p>
+          <a:p>
+            <a:r>
+              <a:rPr lang="en-US" dirty="0"/>
+              <a:t>Multi language support</a:t>
+            </a:r>
+          </a:p>
+          <a:p>
+            <a:endParaRPr lang="en-US" dirty="0" smtClean="0"/>
           </a:p>
         </p:txBody>
       </p:sp>
@@ -14958,7 +15108,7 @@
         </p:blipFill>
         <p:spPr>
           <a:xfrm>
-            <a:off x="2447353" y="3590487"/>
+            <a:off x="8493926" y="912711"/>
             <a:ext cx="2524125" cy="2806121"/>
           </a:xfrm>
           <a:prstGeom prst="rect">
@@ -14988,7 +15138,7 @@
         </p:blipFill>
         <p:spPr>
           <a:xfrm>
-            <a:off x="6791509" y="3953263"/>
+            <a:off x="5529446" y="4322379"/>
             <a:ext cx="2526417" cy="2186559"/>
           </a:xfrm>
           <a:prstGeom prst="rect">
@@ -15181,7 +15331,7 @@
                             </p:stCondLst>
                             <p:childTnLst>
                               <p:par>
-                                <p:cTn id="13" presetID="6" presetClass="entr" presetSubtype="16" fill="hold" nodeType="clickEffect">
+                                <p:cTn id="13" presetID="31" presetClass="entr" presetSubtype="0" fill="hold" grpId="0" nodeType="clickEffect">
                                   <p:stCondLst>
                                     <p:cond delay="0"/>
                                   </p:stCondLst>
@@ -15194,7 +15344,11 @@
                                           </p:stCondLst>
                                         </p:cTn>
                                         <p:tgtEl>
-                                          <p:spTgt spid="4"/>
+                                          <p:spTgt spid="3">
+                                            <p:txEl>
+                                              <p:pRg st="1" end="1"/>
+                                            </p:txEl>
+                                          </p:spTgt>
                                         </p:tgtEl>
                                         <p:attrNameLst>
                                           <p:attrName>style.visibility</p:attrName>
@@ -15204,11 +15358,96 @@
                                         <p:strVal val="visible"/>
                                       </p:to>
                                     </p:set>
-                                    <p:animEffect transition="in" filter="circle(in)">
-                                      <p:cBhvr>
-                                        <p:cTn id="15" dur="2000"/>
-                                        <p:tgtEl>
-                                          <p:spTgt spid="4"/>
+                                    <p:anim calcmode="lin" valueType="num">
+                                      <p:cBhvr>
+                                        <p:cTn id="15" dur="1000" fill="hold"/>
+                                        <p:tgtEl>
+                                          <p:spTgt spid="3">
+                                            <p:txEl>
+                                              <p:pRg st="1" end="1"/>
+                                            </p:txEl>
+                                          </p:spTgt>
+                                        </p:tgtEl>
+                                        <p:attrNameLst>
+                                          <p:attrName>ppt_w</p:attrName>
+                                        </p:attrNameLst>
+                                      </p:cBhvr>
+                                      <p:tavLst>
+                                        <p:tav tm="0">
+                                          <p:val>
+                                            <p:fltVal val="0"/>
+                                          </p:val>
+                                        </p:tav>
+                                        <p:tav tm="100000">
+                                          <p:val>
+                                            <p:strVal val="#ppt_w"/>
+                                          </p:val>
+                                        </p:tav>
+                                      </p:tavLst>
+                                    </p:anim>
+                                    <p:anim calcmode="lin" valueType="num">
+                                      <p:cBhvr>
+                                        <p:cTn id="16" dur="1000" fill="hold"/>
+                                        <p:tgtEl>
+                                          <p:spTgt spid="3">
+                                            <p:txEl>
+                                              <p:pRg st="1" end="1"/>
+                                            </p:txEl>
+                                          </p:spTgt>
+                                        </p:tgtEl>
+                                        <p:attrNameLst>
+                                          <p:attrName>ppt_h</p:attrName>
+                                        </p:attrNameLst>
+                                      </p:cBhvr>
+                                      <p:tavLst>
+                                        <p:tav tm="0">
+                                          <p:val>
+                                            <p:fltVal val="0"/>
+                                          </p:val>
+                                        </p:tav>
+                                        <p:tav tm="100000">
+                                          <p:val>
+                                            <p:strVal val="#ppt_h"/>
+                                          </p:val>
+                                        </p:tav>
+                                      </p:tavLst>
+                                    </p:anim>
+                                    <p:anim calcmode="lin" valueType="num">
+                                      <p:cBhvr>
+                                        <p:cTn id="17" dur="1000" fill="hold"/>
+                                        <p:tgtEl>
+                                          <p:spTgt spid="3">
+                                            <p:txEl>
+                                              <p:pRg st="1" end="1"/>
+                                            </p:txEl>
+                                          </p:spTgt>
+                                        </p:tgtEl>
+                                        <p:attrNameLst>
+                                          <p:attrName>style.rotation</p:attrName>
+                                        </p:attrNameLst>
+                                      </p:cBhvr>
+                                      <p:tavLst>
+                                        <p:tav tm="0">
+                                          <p:val>
+                                            <p:fltVal val="90"/>
+                                          </p:val>
+                                        </p:tav>
+                                        <p:tav tm="100000">
+                                          <p:val>
+                                            <p:fltVal val="0"/>
+                                          </p:val>
+                                        </p:tav>
+                                      </p:tavLst>
+                                    </p:anim>
+                                    <p:animEffect transition="in" filter="fade">
+                                      <p:cBhvr>
+                                        <p:cTn id="18" dur="1000"/>
+                                        <p:tgtEl>
+                                          <p:spTgt spid="3">
+                                            <p:txEl>
+                                              <p:pRg st="1" end="1"/>
+                                            </p:txEl>
+                                          </p:spTgt>
                                         </p:tgtEl>
                                       </p:cBhvr>
                                     </p:animEffect>
@@ -15222,32 +15461,36 @@
                     </p:cTn>
                   </p:par>
                   <p:par>
-                    <p:cTn id="16" fill="hold">
+                    <p:cTn id="19" fill="hold">
                       <p:stCondLst>
                         <p:cond delay="indefinite"/>
                       </p:stCondLst>
                       <p:childTnLst>
                         <p:par>
-                          <p:cTn id="17" fill="hold">
+                          <p:cTn id="20" fill="hold">
                             <p:stCondLst>
                               <p:cond delay="0"/>
                             </p:stCondLst>
                             <p:childTnLst>
                               <p:par>
-                                <p:cTn id="18" presetID="2" presetClass="entr" presetSubtype="6" fill="hold" nodeType="clickEffect">
+                                <p:cTn id="21" presetID="31" presetClass="entr" presetSubtype="0" fill="hold" grpId="0" nodeType="clickEffect">
                                   <p:stCondLst>
                                     <p:cond delay="0"/>
                                   </p:stCondLst>
                                   <p:childTnLst>
                                     <p:set>
                                       <p:cBhvr>
-                                        <p:cTn id="19" dur="1" fill="hold">
+                                        <p:cTn id="22" dur="1" fill="hold">
                                           <p:stCondLst>
                                             <p:cond delay="0"/>
                                           </p:stCondLst>
                                         </p:cTn>
                                         <p:tgtEl>
-                                          <p:spTgt spid="5"/>
+                                          <p:spTgt spid="3">
+                                            <p:txEl>
+                                              <p:pRg st="2" end="2"/>
+                                            </p:txEl>
+                                          </p:spTgt>
                                         </p:tgtEl>
                                         <p:attrNameLst>
                                           <p:attrName>style.visibility</p:attrName>
@@ -15258,161 +15501,66 @@
                                       </p:to>
                                     </p:set>
                                     <p:anim calcmode="lin" valueType="num">
-                                      <p:cBhvr additive="base">
-                                        <p:cTn id="20" dur="500" fill="hold"/>
-                                        <p:tgtEl>
-                                          <p:spTgt spid="5"/>
-                                        </p:tgtEl>
-                                        <p:attrNameLst>
-                                          <p:attrName>ppt_x</p:attrName>
+                                      <p:cBhvr>
+                                        <p:cTn id="23" dur="1000" fill="hold"/>
+                                        <p:tgtEl>
+                                          <p:spTgt spid="3">
+                                            <p:txEl>
+                                              <p:pRg st="2" end="2"/>
+                                            </p:txEl>
+                                          </p:spTgt>
+                                        </p:tgtEl>
+                                        <p:attrNameLst>
+                                          <p:attrName>ppt_w</p:attrName>
                                         </p:attrNameLst>
                                       </p:cBhvr>
                                       <p:tavLst>
                                         <p:tav tm="0">
                                           <p:val>
-                                            <p:strVal val="1+#ppt_w/2"/>
+                                            <p:fltVal val="0"/>
                                           </p:val>
                                         </p:tav>
                                         <p:tav tm="100000">
                                           <p:val>
-                                            <p:strVal val="#ppt_x"/>
+                                            <p:strVal val="#ppt_w"/>
                                           </p:val>
                                         </p:tav>
                                       </p:tavLst>
                                     </p:anim>
                                     <p:anim calcmode="lin" valueType="num">
-                                      <p:cBhvr additive="base">
-                                        <p:cTn id="21" dur="500" fill="hold"/>
-                                        <p:tgtEl>
-                                          <p:spTgt spid="5"/>
-                                        </p:tgtEl>
-                                        <p:attrNameLst>
-                                          <p:attrName>ppt_y</p:attrName>
+                                      <p:cBhvr>
+                                        <p:cTn id="24" dur="1000" fill="hold"/>
+                                        <p:tgtEl>
+                                          <p:spTgt spid="3">
+                                            <p:txEl>
+                                              <p:pRg st="2" end="2"/>
+                                            </p:txEl>
+                                          </p:spTgt>
+                                        </p:tgtEl>
+                                        <p:attrNameLst>
+                                          <p:attrName>ppt_h</p:attrName>
                                         </p:attrNameLst>
                                       </p:cBhvr>
                                       <p:tavLst>
                                         <p:tav tm="0">
                                           <p:val>
-                                            <p:strVal val="1+#ppt_h/2"/>
+                                            <p:fltVal val="0"/>
                                           </p:val>
                                         </p:tav>
                                         <p:tav tm="100000">
                                           <p:val>
-                                            <p:strVal val="#ppt_y"/>
-                                          </p:val>
-                                        </p:tav>
-                                      </p:tavLst>
-                                    </p:anim>
-                                  </p:childTnLst>
-                                </p:cTn>
-                              </p:par>
-                            </p:childTnLst>
-                          </p:cTn>
-                        </p:par>
-                      </p:childTnLst>
-                    </p:cTn>
-                  </p:par>
-                  <p:par>
-                    <p:cTn id="22" fill="hold">
-                      <p:stCondLst>
-                        <p:cond delay="indefinite"/>
-                      </p:stCondLst>
-                      <p:childTnLst>
-                        <p:par>
-                          <p:cTn id="23" fill="hold">
-                            <p:stCondLst>
-                              <p:cond delay="0"/>
-                            </p:stCondLst>
-                            <p:childTnLst>
-                              <p:par>
-                                <p:cTn id="24" presetID="31" presetClass="entr" presetSubtype="0" fill="hold" grpId="0" nodeType="clickEffect">
-                                  <p:stCondLst>
-                                    <p:cond delay="0"/>
-                                  </p:stCondLst>
-                                  <p:childTnLst>
-                                    <p:set>
-                                      <p:cBhvr>
-                                        <p:cTn id="25" dur="1" fill="hold">
-                                          <p:stCondLst>
-                                            <p:cond delay="0"/>
-                                          </p:stCondLst>
-                                        </p:cTn>
-                                        <p:tgtEl>
-                                          <p:spTgt spid="3">
-                                            <p:txEl>
-                                              <p:pRg st="1" end="1"/>
-                                            </p:txEl>
-                                          </p:spTgt>
-                                        </p:tgtEl>
-                                        <p:attrNameLst>
-                                          <p:attrName>style.visibility</p:attrName>
-                                        </p:attrNameLst>
-                                      </p:cBhvr>
-                                      <p:to>
-                                        <p:strVal val="visible"/>
-                                      </p:to>
-                                    </p:set>
-                                    <p:anim calcmode="lin" valueType="num">
-                                      <p:cBhvr>
-                                        <p:cTn id="26" dur="1000" fill="hold"/>
-                                        <p:tgtEl>
-                                          <p:spTgt spid="3">
-                                            <p:txEl>
-                                              <p:pRg st="1" end="1"/>
-                                            </p:txEl>
-                                          </p:spTgt>
-                                        </p:tgtEl>
-                                        <p:attrNameLst>
-                                          <p:attrName>ppt_w</p:attrName>
-                                        </p:attrNameLst>
-                                      </p:cBhvr>
-                                      <p:tavLst>
-                                        <p:tav tm="0">
-                                          <p:val>
-                                            <p:fltVal val="0"/>
-                                          </p:val>
-                                        </p:tav>
-                                        <p:tav tm="100000">
-                                          <p:val>
-                                            <p:strVal val="#ppt_w"/>
+                                            <p:strVal val="#ppt_h"/>
                                           </p:val>
                                         </p:tav>
                                       </p:tavLst>
                                     </p:anim>
                                     <p:anim calcmode="lin" valueType="num">
                                       <p:cBhvr>
-                                        <p:cTn id="27" dur="1000" fill="hold"/>
+                                        <p:cTn id="25" dur="1000" fill="hold"/>
                                         <p:tgtEl>
                                           <p:spTgt spid="3">
                                             <p:txEl>
-                                              <p:pRg st="1" end="1"/>
-                                            </p:txEl>
-                                          </p:spTgt>
-                                        </p:tgtEl>
-                                        <p:attrNameLst>
-                                          <p:attrName>ppt_h</p:attrName>
-                                        </p:attrNameLst>
-                                      </p:cBhvr>
-                                      <p:tavLst>
-                                        <p:tav tm="0">
-                                          <p:val>
-                                            <p:fltVal val="0"/>
-                                          </p:val>
-                                        </p:tav>
-                                        <p:tav tm="100000">
-                                          <p:val>
-                                            <p:strVal val="#ppt_h"/>
-                                          </p:val>
-                                        </p:tav>
-                                      </p:tavLst>
-                                    </p:anim>
-                                    <p:anim calcmode="lin" valueType="num">
-                                      <p:cBhvr>
-                                        <p:cTn id="28" dur="1000" fill="hold"/>
-                                        <p:tgtEl>
-                                          <p:spTgt spid="3">
-                                            <p:txEl>
-                                              <p:pRg st="1" end="1"/>
+                                              <p:pRg st="2" end="2"/>
                                             </p:txEl>
                                           </p:spTgt>
                                         </p:tgtEl>
@@ -15435,11 +15583,11 @@
                                     </p:anim>
                                     <p:animEffect transition="in" filter="fade">
                                       <p:cBhvr>
-                                        <p:cTn id="29" dur="1000"/>
+                                        <p:cTn id="26" dur="1000"/>
                                         <p:tgtEl>
                                           <p:spTgt spid="3">
                                             <p:txEl>
-                                              <p:pRg st="1" end="1"/>
+                                              <p:pRg st="2" end="2"/>
                                             </p:txEl>
                                           </p:spTgt>
                                         </p:tgtEl>
@@ -15455,26 +15603,26 @@
                     </p:cTn>
                   </p:par>
                   <p:par>
-                    <p:cTn id="30" fill="hold">
+                    <p:cTn id="27" fill="hold">
                       <p:stCondLst>
                         <p:cond delay="indefinite"/>
                       </p:stCondLst>
                       <p:childTnLst>
                         <p:par>
-                          <p:cTn id="31" fill="hold">
+                          <p:cTn id="28" fill="hold">
                             <p:stCondLst>
                               <p:cond delay="0"/>
                             </p:stCondLst>
                             <p:childTnLst>
                               <p:par>
-                                <p:cTn id="32" presetID="31" presetClass="entr" presetSubtype="0" fill="hold" grpId="0" nodeType="clickEffect">
+                                <p:cTn id="29" presetID="31" presetClass="entr" presetSubtype="0" fill="hold" grpId="0" nodeType="clickEffect">
                                   <p:stCondLst>
                                     <p:cond delay="0"/>
                                   </p:stCondLst>
                                   <p:childTnLst>
                                     <p:set>
                                       <p:cBhvr>
-                                        <p:cTn id="33" dur="1" fill="hold">
+                                        <p:cTn id="30" dur="1" fill="hold">
                                           <p:stCondLst>
                                             <p:cond delay="0"/>
                                           </p:stCondLst>
@@ -15482,7 +15630,7 @@
                                         <p:tgtEl>
                                           <p:spTgt spid="3">
                                             <p:txEl>
-                                              <p:pRg st="2" end="2"/>
+                                              <p:pRg st="3" end="3"/>
                                             </p:txEl>
                                           </p:spTgt>
                                         </p:tgtEl>
@@ -15496,11 +15644,11 @@
                                     </p:set>
                                     <p:anim calcmode="lin" valueType="num">
                                       <p:cBhvr>
-                                        <p:cTn id="34" dur="1000" fill="hold"/>
+                                        <p:cTn id="31" dur="1000" fill="hold"/>
                                         <p:tgtEl>
                                           <p:spTgt spid="3">
                                             <p:txEl>
-                                              <p:pRg st="2" end="2"/>
+                                              <p:pRg st="3" end="3"/>
                                             </p:txEl>
                                           </p:spTgt>
                                         </p:tgtEl>
@@ -15523,11 +15671,11 @@
                                     </p:anim>
                                     <p:anim calcmode="lin" valueType="num">
                                       <p:cBhvr>
-                                        <p:cTn id="35" dur="1000" fill="hold"/>
+                                        <p:cTn id="32" dur="1000" fill="hold"/>
                                         <p:tgtEl>
                                           <p:spTgt spid="3">
                                             <p:txEl>
-                                              <p:pRg st="2" end="2"/>
+                                              <p:pRg st="3" end="3"/>
                                             </p:txEl>
                                           </p:spTgt>
                                         </p:tgtEl>
@@ -15550,11 +15698,11 @@
                                     </p:anim>
                                     <p:anim calcmode="lin" valueType="num">
                                       <p:cBhvr>
-                                        <p:cTn id="36" dur="1000" fill="hold"/>
+                                        <p:cTn id="33" dur="1000" fill="hold"/>
                                         <p:tgtEl>
                                           <p:spTgt spid="3">
                                             <p:txEl>
-                                              <p:pRg st="2" end="2"/>
+                                              <p:pRg st="3" end="3"/>
                                             </p:txEl>
                                           </p:spTgt>
                                         </p:tgtEl>
@@ -15577,11 +15725,11 @@
                                     </p:anim>
                                     <p:animEffect transition="in" filter="fade">
                                       <p:cBhvr>
-                                        <p:cTn id="37" dur="1000"/>
+                                        <p:cTn id="34" dur="1000"/>
                                         <p:tgtEl>
                                           <p:spTgt spid="3">
                                             <p:txEl>
-                                              <p:pRg st="2" end="2"/>
+                                              <p:pRg st="3" end="3"/>
                                             </p:txEl>
                                           </p:spTgt>
                                         </p:tgtEl>
@@ -15597,49 +15745,138 @@
                     </p:cTn>
                   </p:par>
                   <p:par>
-                    <p:cTn id="38" fill="hold">
+                    <p:cTn id="35" fill="hold">
                       <p:stCondLst>
                         <p:cond delay="indefinite"/>
                       </p:stCondLst>
                       <p:childTnLst>
                         <p:par>
-                          <p:cTn id="39" fill="hold">
+                          <p:cTn id="36" fill="hold">
                             <p:stCondLst>
                               <p:cond delay="0"/>
                             </p:stCondLst>
                             <p:childTnLst>
                               <p:par>
-                                <p:cTn id="40" presetID="16" presetClass="exit" presetSubtype="21" fill="hold" nodeType="clickEffect">
+                                <p:cTn id="37" presetID="31" presetClass="entr" presetSubtype="0" fill="hold" grpId="0" nodeType="clickEffect">
                                   <p:stCondLst>
                                     <p:cond delay="0"/>
                                   </p:stCondLst>
                                   <p:childTnLst>
-                                    <p:animEffect transition="out" filter="barn(inVertical)">
-                                      <p:cBhvr>
-                                        <p:cTn id="41" dur="500"/>
-                                        <p:tgtEl>
-                                          <p:spTgt spid="4"/>
-                                        </p:tgtEl>
-                                      </p:cBhvr>
-                                    </p:animEffect>
                                     <p:set>
                                       <p:cBhvr>
-                                        <p:cTn id="42" dur="1" fill="hold">
+                                        <p:cTn id="38" dur="1" fill="hold">
                                           <p:stCondLst>
-                                            <p:cond delay="499"/>
+                                            <p:cond delay="0"/>
                                           </p:stCondLst>
                                         </p:cTn>
                                         <p:tgtEl>
-                                          <p:spTgt spid="4"/>
+                                          <p:spTgt spid="3">
+                                            <p:txEl>
+                                              <p:pRg st="4" end="4"/>
+                                            </p:txEl>
+                                          </p:spTgt>
                                         </p:tgtEl>
                                         <p:attrNameLst>
                                           <p:attrName>style.visibility</p:attrName>
                                         </p:attrNameLst>
                                       </p:cBhvr>
                                       <p:to>
-                                        <p:strVal val="hidden"/>
+                                        <p:strVal val="visible"/>
                                       </p:to>
                                     </p:set>
+                                    <p:anim calcmode="lin" valueType="num">
+                                      <p:cBhvr>
+                                        <p:cTn id="39" dur="1000" fill="hold"/>
+                                        <p:tgtEl>
+                                          <p:spTgt spid="3">
+                                            <p:txEl>
+                                              <p:pRg st="4" end="4"/>
+                                            </p:txEl>
+                                          </p:spTgt>
+                                        </p:tgtEl>
+                                        <p:attrNameLst>
+                                          <p:attrName>ppt_w</p:attrName>
+                                        </p:attrNameLst>
+                                      </p:cBhvr>
+                                      <p:tavLst>
+                                        <p:tav tm="0">
+                                          <p:val>
+                                            <p:fltVal val="0"/>
+                                          </p:val>
+                                        </p:tav>
+                                        <p:tav tm="100000">
+                                          <p:val>
+                                            <p:strVal val="#ppt_w"/>
+                                          </p:val>
+                                        </p:tav>
+                                      </p:tavLst>
+                                    </p:anim>
+                                    <p:anim calcmode="lin" valueType="num">
+                                      <p:cBhvr>
+                                        <p:cTn id="40" dur="1000" fill="hold"/>
+                                        <p:tgtEl>
+                                          <p:spTgt spid="3">
+                                            <p:txEl>
+                                              <p:pRg st="4" end="4"/>
+                                            </p:txEl>
+                                          </p:spTgt>
+                                        </p:tgtEl>
+                                        <p:attrNameLst>
+                                          <p:attrName>ppt_h</p:attrName>
+                                        </p:attrNameLst>
+                                      </p:cBhvr>
+                                      <p:tavLst>
+                                        <p:tav tm="0">
+                                          <p:val>
+                                            <p:fltVal val="0"/>
+                                          </p:val>
+                                        </p:tav>
+                                        <p:tav tm="100000">
+                                          <p:val>
+                                            <p:strVal val="#ppt_h"/>
+                                          </p:val>
+                                        </p:tav>
+                                      </p:tavLst>
+                                    </p:anim>
+                                    <p:anim calcmode="lin" valueType="num">
+                                      <p:cBhvr>
+                                        <p:cTn id="41" dur="1000" fill="hold"/>
+                                        <p:tgtEl>
+                                          <p:spTgt spid="3">
+                                            <p:txEl>
+                                              <p:pRg st="4" end="4"/>
+                                            </p:txEl>
+                                          </p:spTgt>
+                                        </p:tgtEl>
+                                        <p:attrNameLst>
+                                          <p:attrName>style.rotation</p:attrName>
+                                        </p:attrNameLst>
+                                      </p:cBhvr>
+                                      <p:tavLst>
+                                        <p:tav tm="0">
+                                          <p:val>
+                                            <p:fltVal val="90"/>
+                                          </p:val>
+                                        </p:tav>
+                                        <p:tav tm="100000">
+                                          <p:val>
+                                            <p:fltVal val="0"/>
+                                          </p:val>
+                                        </p:tav>
+                                      </p:tavLst>
+                                    </p:anim>
+                                    <p:animEffect transition="in" filter="fade">
+                                      <p:cBhvr>
+                                        <p:cTn id="42" dur="1000"/>
+                                        <p:tgtEl>
+                                          <p:spTgt spid="3">
+                                            <p:txEl>
+                                              <p:pRg st="4" end="4"/>
+                                            </p:txEl>
+                                          </p:spTgt>
+                                        </p:tgtEl>
+                                      </p:cBhvr>
+                                    </p:animEffect>
                                   </p:childTnLst>
                                 </p:cTn>
                               </p:par>
@@ -15662,14 +15899,637 @@
                             </p:stCondLst>
                             <p:childTnLst>
                               <p:par>
-                                <p:cTn id="45" presetID="2" presetClass="exit" presetSubtype="9" fill="hold" nodeType="clickEffect">
+                                <p:cTn id="45" presetID="31" presetClass="entr" presetSubtype="0" fill="hold" grpId="0" nodeType="clickEffect">
+                                  <p:stCondLst>
+                                    <p:cond delay="0"/>
+                                  </p:stCondLst>
+                                  <p:childTnLst>
+                                    <p:set>
+                                      <p:cBhvr>
+                                        <p:cTn id="46" dur="1" fill="hold">
+                                          <p:stCondLst>
+                                            <p:cond delay="0"/>
+                                          </p:stCondLst>
+                                        </p:cTn>
+                                        <p:tgtEl>
+                                          <p:spTgt spid="3">
+                                            <p:txEl>
+                                              <p:pRg st="5" end="5"/>
+                                            </p:txEl>
+                                          </p:spTgt>
+                                        </p:tgtEl>
+                                        <p:attrNameLst>
+                                          <p:attrName>style.visibility</p:attrName>
+                                        </p:attrNameLst>
+                                      </p:cBhvr>
+                                      <p:to>
+                                        <p:strVal val="visible"/>
+                                      </p:to>
+                                    </p:set>
+                                    <p:anim calcmode="lin" valueType="num">
+                                      <p:cBhvr>
+                                        <p:cTn id="47" dur="1000" fill="hold"/>
+                                        <p:tgtEl>
+                                          <p:spTgt spid="3">
+                                            <p:txEl>
+                                              <p:pRg st="5" end="5"/>
+                                            </p:txEl>
+                                          </p:spTgt>
+                                        </p:tgtEl>
+                                        <p:attrNameLst>
+                                          <p:attrName>ppt_w</p:attrName>
+                                        </p:attrNameLst>
+                                      </p:cBhvr>
+                                      <p:tavLst>
+                                        <p:tav tm="0">
+                                          <p:val>
+                                            <p:fltVal val="0"/>
+                                          </p:val>
+                                        </p:tav>
+                                        <p:tav tm="100000">
+                                          <p:val>
+                                            <p:strVal val="#ppt_w"/>
+                                          </p:val>
+                                        </p:tav>
+                                      </p:tavLst>
+                                    </p:anim>
+                                    <p:anim calcmode="lin" valueType="num">
+                                      <p:cBhvr>
+                                        <p:cTn id="48" dur="1000" fill="hold"/>
+                                        <p:tgtEl>
+                                          <p:spTgt spid="3">
+                                            <p:txEl>
+                                              <p:pRg st="5" end="5"/>
+                                            </p:txEl>
+                                          </p:spTgt>
+                                        </p:tgtEl>
+                                        <p:attrNameLst>
+                                          <p:attrName>ppt_h</p:attrName>
+                                        </p:attrNameLst>
+                                      </p:cBhvr>
+                                      <p:tavLst>
+                                        <p:tav tm="0">
+                                          <p:val>
+                                            <p:fltVal val="0"/>
+                                          </p:val>
+                                        </p:tav>
+                                        <p:tav tm="100000">
+                                          <p:val>
+                                            <p:strVal val="#ppt_h"/>
+                                          </p:val>
+                                        </p:tav>
+                                      </p:tavLst>
+                                    </p:anim>
+                                    <p:anim calcmode="lin" valueType="num">
+                                      <p:cBhvr>
+                                        <p:cTn id="49" dur="1000" fill="hold"/>
+                                        <p:tgtEl>
+                                          <p:spTgt spid="3">
+                                            <p:txEl>
+                                              <p:pRg st="5" end="5"/>
+                                            </p:txEl>
+                                          </p:spTgt>
+                                        </p:tgtEl>
+                                        <p:attrNameLst>
+                                          <p:attrName>style.rotation</p:attrName>
+                                        </p:attrNameLst>
+                                      </p:cBhvr>
+                                      <p:tavLst>
+                                        <p:tav tm="0">
+                                          <p:val>
+                                            <p:fltVal val="90"/>
+                                          </p:val>
+                                        </p:tav>
+                                        <p:tav tm="100000">
+                                          <p:val>
+                                            <p:fltVal val="0"/>
+                                          </p:val>
+                                        </p:tav>
+                                      </p:tavLst>
+                                    </p:anim>
+                                    <p:animEffect transition="in" filter="fade">
+                                      <p:cBhvr>
+                                        <p:cTn id="50" dur="1000"/>
+                                        <p:tgtEl>
+                                          <p:spTgt spid="3">
+                                            <p:txEl>
+                                              <p:pRg st="5" end="5"/>
+                                            </p:txEl>
+                                          </p:spTgt>
+                                        </p:tgtEl>
+                                      </p:cBhvr>
+                                    </p:animEffect>
+                                  </p:childTnLst>
+                                </p:cTn>
+                              </p:par>
+                            </p:childTnLst>
+                          </p:cTn>
+                        </p:par>
+                      </p:childTnLst>
+                    </p:cTn>
+                  </p:par>
+                  <p:par>
+                    <p:cTn id="51" fill="hold">
+                      <p:stCondLst>
+                        <p:cond delay="indefinite"/>
+                      </p:stCondLst>
+                      <p:childTnLst>
+                        <p:par>
+                          <p:cTn id="52" fill="hold">
+                            <p:stCondLst>
+                              <p:cond delay="0"/>
+                            </p:stCondLst>
+                            <p:childTnLst>
+                              <p:par>
+                                <p:cTn id="53" presetID="31" presetClass="entr" presetSubtype="0" fill="hold" grpId="0" nodeType="clickEffect">
+                                  <p:stCondLst>
+                                    <p:cond delay="0"/>
+                                  </p:stCondLst>
+                                  <p:childTnLst>
+                                    <p:set>
+                                      <p:cBhvr>
+                                        <p:cTn id="54" dur="1" fill="hold">
+                                          <p:stCondLst>
+                                            <p:cond delay="0"/>
+                                          </p:stCondLst>
+                                        </p:cTn>
+                                        <p:tgtEl>
+                                          <p:spTgt spid="3">
+                                            <p:txEl>
+                                              <p:pRg st="6" end="6"/>
+                                            </p:txEl>
+                                          </p:spTgt>
+                                        </p:tgtEl>
+                                        <p:attrNameLst>
+                                          <p:attrName>style.visibility</p:attrName>
+                                        </p:attrNameLst>
+                                      </p:cBhvr>
+                                      <p:to>
+                                        <p:strVal val="visible"/>
+                                      </p:to>
+                                    </p:set>
+                                    <p:anim calcmode="lin" valueType="num">
+                                      <p:cBhvr>
+                                        <p:cTn id="55" dur="1000" fill="hold"/>
+                                        <p:tgtEl>
+                                          <p:spTgt spid="3">
+                                            <p:txEl>
+                                              <p:pRg st="6" end="6"/>
+                                            </p:txEl>
+                                          </p:spTgt>
+                                        </p:tgtEl>
+                                        <p:attrNameLst>
+                                          <p:attrName>ppt_w</p:attrName>
+                                        </p:attrNameLst>
+                                      </p:cBhvr>
+                                      <p:tavLst>
+                                        <p:tav tm="0">
+                                          <p:val>
+                                            <p:fltVal val="0"/>
+                                          </p:val>
+                                        </p:tav>
+                                        <p:tav tm="100000">
+                                          <p:val>
+                                            <p:strVal val="#ppt_w"/>
+                                          </p:val>
+                                        </p:tav>
+                                      </p:tavLst>
+                                    </p:anim>
+                                    <p:anim calcmode="lin" valueType="num">
+                                      <p:cBhvr>
+                                        <p:cTn id="56" dur="1000" fill="hold"/>
+                                        <p:tgtEl>
+                                          <p:spTgt spid="3">
+                                            <p:txEl>
+                                              <p:pRg st="6" end="6"/>
+                                            </p:txEl>
+                                          </p:spTgt>
+                                        </p:tgtEl>
+                                        <p:attrNameLst>
+                                          <p:attrName>ppt_h</p:attrName>
+                                        </p:attrNameLst>
+                                      </p:cBhvr>
+                                      <p:tavLst>
+                                        <p:tav tm="0">
+                                          <p:val>
+                                            <p:fltVal val="0"/>
+                                          </p:val>
+                                        </p:tav>
+                                        <p:tav tm="100000">
+                                          <p:val>
+                                            <p:strVal val="#ppt_h"/>
+                                          </p:val>
+                                        </p:tav>
+                                      </p:tavLst>
+                                    </p:anim>
+                                    <p:anim calcmode="lin" valueType="num">
+                                      <p:cBhvr>
+                                        <p:cTn id="57" dur="1000" fill="hold"/>
+                                        <p:tgtEl>
+                                          <p:spTgt spid="3">
+                                            <p:txEl>
+                                              <p:pRg st="6" end="6"/>
+                                            </p:txEl>
+                                          </p:spTgt>
+                                        </p:tgtEl>
+                                        <p:attrNameLst>
+                                          <p:attrName>style.rotation</p:attrName>
+                                        </p:attrNameLst>
+                                      </p:cBhvr>
+                                      <p:tavLst>
+                                        <p:tav tm="0">
+                                          <p:val>
+                                            <p:fltVal val="90"/>
+                                          </p:val>
+                                        </p:tav>
+                                        <p:tav tm="100000">
+                                          <p:val>
+                                            <p:fltVal val="0"/>
+                                          </p:val>
+                                        </p:tav>
+                                      </p:tavLst>
+                                    </p:anim>
+                                    <p:animEffect transition="in" filter="fade">
+                                      <p:cBhvr>
+                                        <p:cTn id="58" dur="1000"/>
+                                        <p:tgtEl>
+                                          <p:spTgt spid="3">
+                                            <p:txEl>
+                                              <p:pRg st="6" end="6"/>
+                                            </p:txEl>
+                                          </p:spTgt>
+                                        </p:tgtEl>
+                                      </p:cBhvr>
+                                    </p:animEffect>
+                                  </p:childTnLst>
+                                </p:cTn>
+                              </p:par>
+                            </p:childTnLst>
+                          </p:cTn>
+                        </p:par>
+                      </p:childTnLst>
+                    </p:cTn>
+                  </p:par>
+                  <p:par>
+                    <p:cTn id="59" fill="hold">
+                      <p:stCondLst>
+                        <p:cond delay="indefinite"/>
+                      </p:stCondLst>
+                      <p:childTnLst>
+                        <p:par>
+                          <p:cTn id="60" fill="hold">
+                            <p:stCondLst>
+                              <p:cond delay="0"/>
+                            </p:stCondLst>
+                            <p:childTnLst>
+                              <p:par>
+                                <p:cTn id="61" presetID="31" presetClass="entr" presetSubtype="0" fill="hold" grpId="0" nodeType="clickEffect">
+                                  <p:stCondLst>
+                                    <p:cond delay="0"/>
+                                  </p:stCondLst>
+                                  <p:childTnLst>
+                                    <p:set>
+                                      <p:cBhvr>
+                                        <p:cTn id="62" dur="1" fill="hold">
+                                          <p:stCondLst>
+                                            <p:cond delay="0"/>
+                                          </p:stCondLst>
+                                        </p:cTn>
+                                        <p:tgtEl>
+                                          <p:spTgt spid="3">
+                                            <p:txEl>
+                                              <p:pRg st="7" end="7"/>
+                                            </p:txEl>
+                                          </p:spTgt>
+                                        </p:tgtEl>
+                                        <p:attrNameLst>
+                                          <p:attrName>style.visibility</p:attrName>
+                                        </p:attrNameLst>
+                                      </p:cBhvr>
+                                      <p:to>
+                                        <p:strVal val="visible"/>
+                                      </p:to>
+                                    </p:set>
+                                    <p:anim calcmode="lin" valueType="num">
+                                      <p:cBhvr>
+                                        <p:cTn id="63" dur="1000" fill="hold"/>
+                                        <p:tgtEl>
+                                          <p:spTgt spid="3">
+                                            <p:txEl>
+                                              <p:pRg st="7" end="7"/>
+                                            </p:txEl>
+                                          </p:spTgt>
+                                        </p:tgtEl>
+                                        <p:attrNameLst>
+                                          <p:attrName>ppt_w</p:attrName>
+                                        </p:attrNameLst>
+                                      </p:cBhvr>
+                                      <p:tavLst>
+                                        <p:tav tm="0">
+                                          <p:val>
+                                            <p:fltVal val="0"/>
+                                          </p:val>
+                                        </p:tav>
+                                        <p:tav tm="100000">
+                                          <p:val>
+                                            <p:strVal val="#ppt_w"/>
+                                          </p:val>
+                                        </p:tav>
+                                      </p:tavLst>
+                                    </p:anim>
+                                    <p:anim calcmode="lin" valueType="num">
+                                      <p:cBhvr>
+                                        <p:cTn id="64" dur="1000" fill="hold"/>
+                                        <p:tgtEl>
+                                          <p:spTgt spid="3">
+                                            <p:txEl>
+                                              <p:pRg st="7" end="7"/>
+                                            </p:txEl>
+                                          </p:spTgt>
+                                        </p:tgtEl>
+                                        <p:attrNameLst>
+                                          <p:attrName>ppt_h</p:attrName>
+                                        </p:attrNameLst>
+                                      </p:cBhvr>
+                                      <p:tavLst>
+                                        <p:tav tm="0">
+                                          <p:val>
+                                            <p:fltVal val="0"/>
+                                          </p:val>
+                                        </p:tav>
+                                        <p:tav tm="100000">
+                                          <p:val>
+                                            <p:strVal val="#ppt_h"/>
+                                          </p:val>
+                                        </p:tav>
+                                      </p:tavLst>
+                                    </p:anim>
+                                    <p:anim calcmode="lin" valueType="num">
+                                      <p:cBhvr>
+                                        <p:cTn id="65" dur="1000" fill="hold"/>
+                                        <p:tgtEl>
+                                          <p:spTgt spid="3">
+                                            <p:txEl>
+                                              <p:pRg st="7" end="7"/>
+                                            </p:txEl>
+                                          </p:spTgt>
+                                        </p:tgtEl>
+                                        <p:attrNameLst>
+                                          <p:attrName>style.rotation</p:attrName>
+                                        </p:attrNameLst>
+                                      </p:cBhvr>
+                                      <p:tavLst>
+                                        <p:tav tm="0">
+                                          <p:val>
+                                            <p:fltVal val="90"/>
+                                          </p:val>
+                                        </p:tav>
+                                        <p:tav tm="100000">
+                                          <p:val>
+                                            <p:fltVal val="0"/>
+                                          </p:val>
+                                        </p:tav>
+                                      </p:tavLst>
+                                    </p:anim>
+                                    <p:animEffect transition="in" filter="fade">
+                                      <p:cBhvr>
+                                        <p:cTn id="66" dur="1000"/>
+                                        <p:tgtEl>
+                                          <p:spTgt spid="3">
+                                            <p:txEl>
+                                              <p:pRg st="7" end="7"/>
+                                            </p:txEl>
+                                          </p:spTgt>
+                                        </p:tgtEl>
+                                      </p:cBhvr>
+                                    </p:animEffect>
+                                  </p:childTnLst>
+                                </p:cTn>
+                              </p:par>
+                            </p:childTnLst>
+                          </p:cTn>
+                        </p:par>
+                      </p:childTnLst>
+                    </p:cTn>
+                  </p:par>
+                  <p:par>
+                    <p:cTn id="67" fill="hold">
+                      <p:stCondLst>
+                        <p:cond delay="indefinite"/>
+                      </p:stCondLst>
+                      <p:childTnLst>
+                        <p:par>
+                          <p:cTn id="68" fill="hold">
+                            <p:stCondLst>
+                              <p:cond delay="0"/>
+                            </p:stCondLst>
+                            <p:childTnLst>
+                              <p:par>
+                                <p:cTn id="69" presetID="6" presetClass="entr" presetSubtype="16" fill="hold" nodeType="clickEffect">
+                                  <p:stCondLst>
+                                    <p:cond delay="0"/>
+                                  </p:stCondLst>
+                                  <p:childTnLst>
+                                    <p:set>
+                                      <p:cBhvr>
+                                        <p:cTn id="70" dur="1" fill="hold">
+                                          <p:stCondLst>
+                                            <p:cond delay="0"/>
+                                          </p:stCondLst>
+                                        </p:cTn>
+                                        <p:tgtEl>
+                                          <p:spTgt spid="4"/>
+                                        </p:tgtEl>
+                                        <p:attrNameLst>
+                                          <p:attrName>style.visibility</p:attrName>
+                                        </p:attrNameLst>
+                                      </p:cBhvr>
+                                      <p:to>
+                                        <p:strVal val="visible"/>
+                                      </p:to>
+                                    </p:set>
+                                    <p:animEffect transition="in" filter="circle(in)">
+                                      <p:cBhvr>
+                                        <p:cTn id="71" dur="2000"/>
+                                        <p:tgtEl>
+                                          <p:spTgt spid="4"/>
+                                        </p:tgtEl>
+                                      </p:cBhvr>
+                                    </p:animEffect>
+                                  </p:childTnLst>
+                                </p:cTn>
+                              </p:par>
+                            </p:childTnLst>
+                          </p:cTn>
+                        </p:par>
+                      </p:childTnLst>
+                    </p:cTn>
+                  </p:par>
+                  <p:par>
+                    <p:cTn id="72" fill="hold">
+                      <p:stCondLst>
+                        <p:cond delay="indefinite"/>
+                      </p:stCondLst>
+                      <p:childTnLst>
+                        <p:par>
+                          <p:cTn id="73" fill="hold">
+                            <p:stCondLst>
+                              <p:cond delay="0"/>
+                            </p:stCondLst>
+                            <p:childTnLst>
+                              <p:par>
+                                <p:cTn id="74" presetID="2" presetClass="entr" presetSubtype="6" fill="hold" nodeType="clickEffect">
+                                  <p:stCondLst>
+                                    <p:cond delay="0"/>
+                                  </p:stCondLst>
+                                  <p:childTnLst>
+                                    <p:set>
+                                      <p:cBhvr>
+                                        <p:cTn id="75" dur="1" fill="hold">
+                                          <p:stCondLst>
+                                            <p:cond delay="0"/>
+                                          </p:stCondLst>
+                                        </p:cTn>
+                                        <p:tgtEl>
+                                          <p:spTgt spid="5"/>
+                                        </p:tgtEl>
+                                        <p:attrNameLst>
+                                          <p:attrName>style.visibility</p:attrName>
+                                        </p:attrNameLst>
+                                      </p:cBhvr>
+                                      <p:to>
+                                        <p:strVal val="visible"/>
+                                      </p:to>
+                                    </p:set>
+                                    <p:anim calcmode="lin" valueType="num">
+                                      <p:cBhvr additive="base">
+                                        <p:cTn id="76" dur="500" fill="hold"/>
+                                        <p:tgtEl>
+                                          <p:spTgt spid="5"/>
+                                        </p:tgtEl>
+                                        <p:attrNameLst>
+                                          <p:attrName>ppt_x</p:attrName>
+                                        </p:attrNameLst>
+                                      </p:cBhvr>
+                                      <p:tavLst>
+                                        <p:tav tm="0">
+                                          <p:val>
+                                            <p:strVal val="1+#ppt_w/2"/>
+                                          </p:val>
+                                        </p:tav>
+                                        <p:tav tm="100000">
+                                          <p:val>
+                                            <p:strVal val="#ppt_x"/>
+                                          </p:val>
+                                        </p:tav>
+                                      </p:tavLst>
+                                    </p:anim>
+                                    <p:anim calcmode="lin" valueType="num">
+                                      <p:cBhvr additive="base">
+                                        <p:cTn id="77" dur="500" fill="hold"/>
+                                        <p:tgtEl>
+                                          <p:spTgt spid="5"/>
+                                        </p:tgtEl>
+                                        <p:attrNameLst>
+                                          <p:attrName>ppt_y</p:attrName>
+                                        </p:attrNameLst>
+                                      </p:cBhvr>
+                                      <p:tavLst>
+                                        <p:tav tm="0">
+                                          <p:val>
+                                            <p:strVal val="1+#ppt_h/2"/>
+                                          </p:val>
+                                        </p:tav>
+                                        <p:tav tm="100000">
+                                          <p:val>
+                                            <p:strVal val="#ppt_y"/>
+                                          </p:val>
+                                        </p:tav>
+                                      </p:tavLst>
+                                    </p:anim>
+                                  </p:childTnLst>
+                                </p:cTn>
+                              </p:par>
+                            </p:childTnLst>
+                          </p:cTn>
+                        </p:par>
+                      </p:childTnLst>
+                    </p:cTn>
+                  </p:par>
+                  <p:par>
+                    <p:cTn id="78" fill="hold">
+                      <p:stCondLst>
+                        <p:cond delay="indefinite"/>
+                      </p:stCondLst>
+                      <p:childTnLst>
+                        <p:par>
+                          <p:cTn id="79" fill="hold">
+                            <p:stCondLst>
+                              <p:cond delay="0"/>
+                            </p:stCondLst>
+                            <p:childTnLst>
+                              <p:par>
+                                <p:cTn id="80" presetID="16" presetClass="exit" presetSubtype="21" fill="hold" nodeType="clickEffect">
+                                  <p:stCondLst>
+                                    <p:cond delay="0"/>
+                                  </p:stCondLst>
+                                  <p:childTnLst>
+                                    <p:animEffect transition="out" filter="barn(inVertical)">
+                                      <p:cBhvr>
+                                        <p:cTn id="81" dur="500"/>
+                                        <p:tgtEl>
+                                          <p:spTgt spid="4"/>
+                                        </p:tgtEl>
+                                      </p:cBhvr>
+                                    </p:animEffect>
+                                    <p:set>
+                                      <p:cBhvr>
+                                        <p:cTn id="82" dur="1" fill="hold">
+                                          <p:stCondLst>
+                                            <p:cond delay="499"/>
+                                          </p:stCondLst>
+                                        </p:cTn>
+                                        <p:tgtEl>
+                                          <p:spTgt spid="4"/>
+                                        </p:tgtEl>
+                                        <p:attrNameLst>
+                                          <p:attrName>style.visibility</p:attrName>
+                                        </p:attrNameLst>
+                                      </p:cBhvr>
+                                      <p:to>
+                                        <p:strVal val="hidden"/>
+                                      </p:to>
+                                    </p:set>
+                                  </p:childTnLst>
+                                </p:cTn>
+                              </p:par>
+                            </p:childTnLst>
+                          </p:cTn>
+                        </p:par>
+                      </p:childTnLst>
+                    </p:cTn>
+                  </p:par>
+                  <p:par>
+                    <p:cTn id="83" fill="hold">
+                      <p:stCondLst>
+                        <p:cond delay="indefinite"/>
+                      </p:stCondLst>
+                      <p:childTnLst>
+                        <p:par>
+                          <p:cTn id="84" fill="hold">
+                            <p:stCondLst>
+                              <p:cond delay="0"/>
+                            </p:stCondLst>
+                            <p:childTnLst>
+                              <p:par>
+                                <p:cTn id="85" presetID="2" presetClass="exit" presetSubtype="9" fill="hold" nodeType="clickEffect">
                                   <p:stCondLst>
                                     <p:cond delay="0"/>
                                   </p:stCondLst>
                                   <p:childTnLst>
                                     <p:anim calcmode="lin" valueType="num">
                                       <p:cBhvr additive="base">
-                                        <p:cTn id="46" dur="500"/>
+                                        <p:cTn id="86" dur="500"/>
                                         <p:tgtEl>
                                           <p:spTgt spid="5"/>
                                         </p:tgtEl>
@@ -15692,7 +16552,7 @@
                                     </p:anim>
                                     <p:anim calcmode="lin" valueType="num">
                                       <p:cBhvr additive="base">
-                                        <p:cTn id="47" dur="500"/>
+                                        <p:cTn id="87" dur="500"/>
                                         <p:tgtEl>
                                           <p:spTgt spid="5"/>
                                         </p:tgtEl>
@@ -15715,7 +16575,7 @@
                                     </p:anim>
                                     <p:set>
                                       <p:cBhvr>
-                                        <p:cTn id="48" dur="1" fill="hold">
+                                        <p:cTn id="88" dur="1" fill="hold">
                                           <p:stCondLst>
                                             <p:cond delay="499"/>
                                           </p:stCondLst>
@@ -15768,7 +16628,7 @@
 </p:sld>
 </file>
 
-<file path=ppt/slides/slide8.xml><?xml version="1.0" encoding="utf-8"?>
+<file path=ppt/slides/slide9.xml><?xml version="1.0" encoding="utf-8"?>
 <p:sld xmlns:a="http://schemas.openxmlformats.org/drawingml/2006/main" xmlns:r="http://schemas.openxmlformats.org/officeDocument/2006/relationships" xmlns:p="http://schemas.openxmlformats.org/presentationml/2006/main">
   <p:cSld>
     <p:spTree>
@@ -15825,33 +16685,13 @@
           <a:p>
             <a:r>
               <a:rPr lang="en-US" dirty="0" smtClean="0"/>
-              <a:t>Working with the Microsoft Technologies has proven to be a challenging, yet </a:t>
+              <a:t>Working with the Microsoft Technologies has proven to be a challenging, yet beneficial experience for the package manager and the website.</a:t>
             </a:r>
+          </a:p>
+          <a:p>
             <a:r>
               <a:rPr lang="en-US" dirty="0" smtClean="0"/>
-              <a:t>beneficial </a:t>
-            </a:r>
-            <a:r>
-              <a:rPr lang="en-US" dirty="0" smtClean="0"/>
-              <a:t>experience for the package manager and the website.</a:t>
-            </a:r>
-          </a:p>
-          <a:p>
-            <a:r>
-              <a:rPr lang="en-US" dirty="0" smtClean="0"/>
-              <a:t>We hope to work with building </a:t>
-            </a:r>
-            <a:r>
-              <a:rPr lang="en-US" dirty="0" smtClean="0"/>
-              <a:t>with</a:t>
-            </a:r>
-            <a:r>
-              <a:rPr lang="en-US" dirty="0" smtClean="0"/>
-              <a:t> </a:t>
-            </a:r>
-            <a:r>
-              <a:rPr lang="en-US" dirty="0" smtClean="0"/>
-              <a:t>mobile app development soon.</a:t>
+              <a:t>We hope to work with building with mobile app development soon.</a:t>
             </a:r>
             <a:endParaRPr lang="en-US" dirty="0"/>
           </a:p>

</xml_diff>